<commit_message>
Update churn analysis presentations and add new PDF report
</commit_message>
<xml_diff>
--- a/presentations/churn_analysis_powerpoint.pptx
+++ b/presentations/churn_analysis_powerpoint.pptx
@@ -6532,7 +6532,7 @@
         </p:blipFill>
         <p:spPr>
           <a:xfrm>
-            <a:off x="12739133" y="3361544"/>
+            <a:off x="12739132" y="3361544"/>
             <a:ext cx="9650798" cy="6992912"/>
           </a:xfrm>
           <a:prstGeom prst="rect">
@@ -7233,8 +7233,8 @@
         </p:nvSpPr>
         <p:spPr>
           <a:xfrm>
-            <a:off x="1269999" y="3900381"/>
-            <a:ext cx="21844001" cy="4488605"/>
+            <a:off x="1270000" y="3900381"/>
+            <a:ext cx="21844000" cy="4488604"/>
           </a:xfrm>
           <a:prstGeom prst="rect">
             <a:avLst/>
@@ -7460,7 +7460,7 @@
       </p:sp>
       <p:sp>
         <p:nvSpPr>
-          <p:cNvPr id="233" name="Our model identified 109 high-risk customers, representing 7.7% of the test group. These customers account for a potential $8,743.50 in monthly revenue at risk, which scales to approximately $104,922 annually. On average, high-risk customers have monthly"/>
+          <p:cNvPr id="233" name="Our model identified 109 high-risk customers, representing 7.7% of the test group. These customers account for a potential $8,743 in monthly revenue at risk, which scales to approximately $104,922 annually. On average, high-risk customers have monthly ch"/>
           <p:cNvSpPr txBox="1"/>
           <p:nvPr>
             <p:ph type="body" idx="21"/>
@@ -7566,7 +7566,7 @@
                   <a:lin ang="3967761" scaled="0"/>
                 </a:gradFill>
               </a:rPr>
-              <a:t>$8,743.50 in monthly revenue at risk</a:t>
+              <a:t>$8,743 in monthly revenue at risk</a:t>
             </a:r>
             <a:r>
               <a:t>, which scales to approximately </a:t>
@@ -7718,8 +7718,8 @@
         </p:nvSpPr>
         <p:spPr>
           <a:xfrm>
-            <a:off x="1269999" y="3209377"/>
-            <a:ext cx="21844001" cy="10556781"/>
+            <a:off x="1270000" y="3209377"/>
+            <a:ext cx="21844000" cy="10556781"/>
           </a:xfrm>
           <a:prstGeom prst="rect">
             <a:avLst/>
@@ -8101,8 +8101,8 @@
         </p:nvSpPr>
         <p:spPr>
           <a:xfrm>
-            <a:off x="1269999" y="3280257"/>
-            <a:ext cx="21844001" cy="3879454"/>
+            <a:off x="1270000" y="3280257"/>
+            <a:ext cx="21844000" cy="3879454"/>
           </a:xfrm>
           <a:prstGeom prst="rect">
             <a:avLst/>

</xml_diff>